<commit_message>
🛠 Fix presentation names
</commit_message>
<xml_diff>
--- a/_presentations/sol2/C++ Now/2018/2018.05.10 - ThePhD - Compile Fast, Run Faster, Scale Forever.pptx
+++ b/_presentations/sol2/C++ Now/2018/2018.05.10 - ThePhD - Compile Fast, Run Faster, Scale Forever.pptx
@@ -265,7 +265,7 @@
           <a:effectLst/>
           <a:extLst>
             <a:ext uri="{91240B29-F687-4f45-9708-019B960494DF}">
-              <a14:hiddenLine xmlns="" xmlns:a14="http://schemas.microsoft.com/office/drawing/2010/main" w="9525">
+              <a14:hiddenLine xmlns:a14="http://schemas.microsoft.com/office/drawing/2010/main" xmlns="" w="9525">
                 <a:solidFill>
                   <a:srgbClr val="000000"/>
                 </a:solidFill>
@@ -458,7 +458,7 @@
             <a:fld id="{08B9EBBA-996F-894A-B54A-D6246ED52CEA}" type="datetimeFigureOut">
               <a:rPr lang="en-US" smtClean="0"/>
               <a:pPr/>
-              <a:t>5/10/2018</a:t>
+              <a:t>2/13/2023</a:t>
             </a:fld>
             <a:endParaRPr lang="en-US" dirty="0"/>
           </a:p>
@@ -783,7 +783,7 @@
             <a:fld id="{09B482E8-6E0E-1B4F-B1FD-C69DB9E858D9}" type="datetimeFigureOut">
               <a:rPr lang="en-US" smtClean="0"/>
               <a:pPr/>
-              <a:t>5/10/2018</a:t>
+              <a:t>2/13/2023</a:t>
             </a:fld>
             <a:endParaRPr lang="en-US" dirty="0"/>
           </a:p>
@@ -1274,7 +1274,7 @@
             <a:fld id="{09B482E8-6E0E-1B4F-B1FD-C69DB9E858D9}" type="datetimeFigureOut">
               <a:rPr lang="en-US" smtClean="0"/>
               <a:pPr/>
-              <a:t>5/10/2018</a:t>
+              <a:t>2/13/2023</a:t>
             </a:fld>
             <a:endParaRPr lang="en-US" dirty="0"/>
           </a:p>
@@ -1646,7 +1646,7 @@
             <a:fld id="{09B482E8-6E0E-1B4F-B1FD-C69DB9E858D9}" type="datetimeFigureOut">
               <a:rPr lang="en-US" smtClean="0"/>
               <a:pPr/>
-              <a:t>5/10/2018</a:t>
+              <a:t>2/13/2023</a:t>
             </a:fld>
             <a:endParaRPr lang="en-US" dirty="0"/>
           </a:p>
@@ -1803,7 +1803,7 @@
           <a:ln/>
           <a:extLst>
             <a:ext uri="{91240B29-F687-4f45-9708-019B960494DF}">
-              <a14:hiddenLine xmlns="" xmlns:a14="http://schemas.microsoft.com/office/drawing/2010/main" w="9525">
+              <a14:hiddenLine xmlns:a14="http://schemas.microsoft.com/office/drawing/2010/main" xmlns="" w="9525">
                 <a:solidFill>
                   <a:srgbClr val="000000"/>
                 </a:solidFill>
@@ -1922,7 +1922,7 @@
             <a:fld id="{09B482E8-6E0E-1B4F-B1FD-C69DB9E858D9}" type="datetimeFigureOut">
               <a:rPr lang="en-US" smtClean="0"/>
               <a:pPr/>
-              <a:t>5/10/2018</a:t>
+              <a:t>2/13/2023</a:t>
             </a:fld>
             <a:endParaRPr lang="en-US" dirty="0"/>
           </a:p>
@@ -2081,7 +2081,7 @@
           <a:ln/>
           <a:extLst>
             <a:ext uri="{91240B29-F687-4f45-9708-019B960494DF}">
-              <a14:hiddenLine xmlns="" xmlns:a14="http://schemas.microsoft.com/office/drawing/2010/main" w="9525">
+              <a14:hiddenLine xmlns:a14="http://schemas.microsoft.com/office/drawing/2010/main" xmlns="" w="9525">
                 <a:solidFill>
                   <a:srgbClr val="000000"/>
                 </a:solidFill>
@@ -2210,7 +2210,7 @@
             <a:fld id="{09B482E8-6E0E-1B4F-B1FD-C69DB9E858D9}" type="datetimeFigureOut">
               <a:rPr lang="en-US" smtClean="0"/>
               <a:pPr/>
-              <a:t>5/10/2018</a:t>
+              <a:t>2/13/2023</a:t>
             </a:fld>
             <a:endParaRPr lang="en-US" dirty="0"/>
           </a:p>
@@ -2372,7 +2372,7 @@
           <a:ln/>
           <a:extLst>
             <a:ext uri="{91240B29-F687-4f45-9708-019B960494DF}">
-              <a14:hiddenLine xmlns="" xmlns:a14="http://schemas.microsoft.com/office/drawing/2010/main" w="9525">
+              <a14:hiddenLine xmlns:a14="http://schemas.microsoft.com/office/drawing/2010/main" xmlns="" w="9525">
                 <a:solidFill>
                   <a:srgbClr val="000000"/>
                 </a:solidFill>
@@ -2501,7 +2501,7 @@
             <a:fld id="{09B482E8-6E0E-1B4F-B1FD-C69DB9E858D9}" type="datetimeFigureOut">
               <a:rPr lang="en-US" smtClean="0"/>
               <a:pPr/>
-              <a:t>5/10/2018</a:t>
+              <a:t>2/13/2023</a:t>
             </a:fld>
             <a:endParaRPr lang="en-US" dirty="0"/>
           </a:p>
@@ -2847,7 +2847,7 @@
             <a:fld id="{8DFA1846-DA80-1C48-A609-854EA85C59AD}" type="datetimeFigureOut">
               <a:rPr lang="en-US" smtClean="0"/>
               <a:pPr/>
-              <a:t>5/10/2018</a:t>
+              <a:t>2/13/2023</a:t>
             </a:fld>
             <a:endParaRPr lang="en-US" dirty="0"/>
           </a:p>
@@ -3008,7 +3008,7 @@
           <a:ln/>
           <a:extLst>
             <a:ext uri="{91240B29-F687-4f45-9708-019B960494DF}">
-              <a14:hiddenLine xmlns="" xmlns:a14="http://schemas.microsoft.com/office/drawing/2010/main" w="9525">
+              <a14:hiddenLine xmlns:a14="http://schemas.microsoft.com/office/drawing/2010/main" xmlns="" w="9525">
                 <a:solidFill>
                   <a:srgbClr val="000000"/>
                 </a:solidFill>
@@ -3193,7 +3193,7 @@
             <a:fld id="{09B482E8-6E0E-1B4F-B1FD-C69DB9E858D9}" type="datetimeFigureOut">
               <a:rPr lang="en-US" smtClean="0"/>
               <a:pPr/>
-              <a:t>5/10/2018</a:t>
+              <a:t>2/13/2023</a:t>
             </a:fld>
             <a:endParaRPr lang="en-US" dirty="0"/>
           </a:p>
@@ -3350,7 +3350,7 @@
           <a:ln/>
           <a:extLst>
             <a:ext uri="{91240B29-F687-4f45-9708-019B960494DF}">
-              <a14:hiddenLine xmlns="" xmlns:a14="http://schemas.microsoft.com/office/drawing/2010/main" w="9525">
+              <a14:hiddenLine xmlns:a14="http://schemas.microsoft.com/office/drawing/2010/main" xmlns="" w="9525">
                 <a:solidFill>
                   <a:srgbClr val="000000"/>
                 </a:solidFill>
@@ -3673,7 +3673,7 @@
             <a:fld id="{09B482E8-6E0E-1B4F-B1FD-C69DB9E858D9}" type="datetimeFigureOut">
               <a:rPr lang="en-US" smtClean="0"/>
               <a:pPr/>
-              <a:t>5/10/2018</a:t>
+              <a:t>2/13/2023</a:t>
             </a:fld>
             <a:endParaRPr lang="en-US" dirty="0"/>
           </a:p>
@@ -3830,7 +3830,7 @@
           <a:ln/>
           <a:extLst>
             <a:ext uri="{91240B29-F687-4f45-9708-019B960494DF}">
-              <a14:hiddenLine xmlns="" xmlns:a14="http://schemas.microsoft.com/office/drawing/2010/main" w="9525">
+              <a14:hiddenLine xmlns:a14="http://schemas.microsoft.com/office/drawing/2010/main" xmlns="" w="9525">
                 <a:solidFill>
                   <a:srgbClr val="000000"/>
                 </a:solidFill>
@@ -3897,7 +3897,7 @@
             <a:fld id="{F13A34C8-038E-2045-AF43-DF7DBB8E0E9E}" type="datetimeFigureOut">
               <a:rPr lang="en-US" smtClean="0"/>
               <a:pPr/>
-              <a:t>5/10/2018</a:t>
+              <a:t>2/13/2023</a:t>
             </a:fld>
             <a:endParaRPr lang="en-US" dirty="0"/>
           </a:p>
@@ -3994,7 +3994,7 @@
             <a:fld id="{8818C68F-D26B-8F47-958C-23B49CF8A634}" type="datetimeFigureOut">
               <a:rPr lang="en-US" smtClean="0"/>
               <a:pPr/>
-              <a:t>5/10/2018</a:t>
+              <a:t>2/13/2023</a:t>
             </a:fld>
             <a:endParaRPr lang="en-US" dirty="0"/>
           </a:p>
@@ -4263,7 +4263,7 @@
           <a:ln/>
           <a:extLst>
             <a:ext uri="{91240B29-F687-4f45-9708-019B960494DF}">
-              <a14:hiddenLine xmlns="" xmlns:a14="http://schemas.microsoft.com/office/drawing/2010/main" w="9525">
+              <a14:hiddenLine xmlns:a14="http://schemas.microsoft.com/office/drawing/2010/main" xmlns="" w="9525">
                 <a:solidFill>
                   <a:srgbClr val="000000"/>
                 </a:solidFill>
@@ -4463,7 +4463,7 @@
             <a:fld id="{09B482E8-6E0E-1B4F-B1FD-C69DB9E858D9}" type="datetimeFigureOut">
               <a:rPr lang="en-US" smtClean="0"/>
               <a:pPr/>
-              <a:t>5/10/2018</a:t>
+              <a:t>2/13/2023</a:t>
             </a:fld>
             <a:endParaRPr lang="en-US" dirty="0"/>
           </a:p>
@@ -4779,7 +4779,7 @@
             <a:fld id="{09B482E8-6E0E-1B4F-B1FD-C69DB9E858D9}" type="datetimeFigureOut">
               <a:rPr lang="en-US" smtClean="0"/>
               <a:pPr/>
-              <a:t>5/10/2018</a:t>
+              <a:t>2/13/2023</a:t>
             </a:fld>
             <a:endParaRPr lang="en-US" dirty="0"/>
           </a:p>
@@ -5052,7 +5052,7 @@
             <a:fld id="{09B482E8-6E0E-1B4F-B1FD-C69DB9E858D9}" type="datetimeFigureOut">
               <a:rPr lang="en-US" smtClean="0"/>
               <a:pPr/>
-              <a:t>5/10/2018</a:t>
+              <a:t>2/13/2023</a:t>
             </a:fld>
             <a:endParaRPr lang="en-US" dirty="0"/>
           </a:p>
@@ -21150,20 +21150,12 @@
               <a:t>, Michael Waller, Elias </a:t>
             </a:r>
             <a:r>
-              <a:rPr lang="en-US" dirty="0" err="1"/>
-              <a:t>Daler</a:t>
-            </a:r>
-            <a:r>
-              <a:rPr lang="en-US" dirty="0"/>
-              <a:t> (</a:t>
-            </a:r>
-            <a:r>
-              <a:rPr lang="en-US" dirty="0" err="1"/>
-              <a:t>Dailidzionak</a:t>
-            </a:r>
-            <a:r>
-              <a:rPr lang="en-US" dirty="0"/>
-              <a:t> Ilya) and Johannes Schultz</a:t>
+              <a:rPr lang="en-US"/>
+              <a:t>Daler and </a:t>
+            </a:r>
+            <a:r>
+              <a:rPr lang="en-US" dirty="0"/>
+              <a:t>Johannes Schultz</a:t>
             </a:r>
           </a:p>
           <a:p>

</xml_diff>